<commit_message>
Tested new indexer, added some comments; finalized presentation
</commit_message>
<xml_diff>
--- a/presentation.pptx
+++ b/presentation.pptx
@@ -5,10 +5,10 @@
     <p:sldMasterId id="2147483712" r:id="rId1"/>
   </p:sldMasterIdLst>
   <p:notesMasterIdLst>
-    <p:notesMasterId r:id="rId12"/>
+    <p:notesMasterId r:id="rId13"/>
   </p:notesMasterIdLst>
   <p:handoutMasterIdLst>
-    <p:handoutMasterId r:id="rId13"/>
+    <p:handoutMasterId r:id="rId14"/>
   </p:handoutMasterIdLst>
   <p:sldIdLst>
     <p:sldId id="257" r:id="rId2"/>
@@ -19,8 +19,9 @@
     <p:sldId id="261" r:id="rId7"/>
     <p:sldId id="262" r:id="rId8"/>
     <p:sldId id="263" r:id="rId9"/>
-    <p:sldId id="265" r:id="rId10"/>
-    <p:sldId id="267" r:id="rId11"/>
+    <p:sldId id="268" r:id="rId10"/>
+    <p:sldId id="265" r:id="rId11"/>
+    <p:sldId id="267" r:id="rId12"/>
   </p:sldIdLst>
   <p:sldSz cx="12192000" cy="6858000"/>
   <p:notesSz cx="6858000" cy="9144000"/>
@@ -214,7 +215,7 @@
             <a:pPr rtl="0"/>
             <a:fld id="{764ED9EE-8F2A-4E06-87A2-36C0DD0993FD}" type="datetime1">
               <a:rPr lang="de-DE" smtClean="0"/>
-              <a:t>04.01.2025</a:t>
+              <a:t>05.01.2025</a:t>
             </a:fld>
             <a:endParaRPr lang="en-US" dirty="0"/>
           </a:p>
@@ -384,7 +385,7 @@
             <a:pPr rtl="0"/>
             <a:fld id="{A5A5ADE8-1FB8-43FD-A675-2B613EE00B6F}" type="datetime1">
               <a:rPr lang="de-DE" smtClean="0"/>
-              <a:t>04.01.2025</a:t>
+              <a:t>05.01.2025</a:t>
             </a:fld>
             <a:endParaRPr lang="en-US"/>
           </a:p>
@@ -723,7 +724,7 @@
             <a:pPr rtl="0"/>
             <a:fld id="{A5A5ADE8-1FB8-43FD-A675-2B613EE00B6F}" type="datetime1">
               <a:rPr lang="de-DE" smtClean="0"/>
-              <a:t>04.01.2025</a:t>
+              <a:t>05.01.2025</a:t>
             </a:fld>
             <a:endParaRPr lang="en-US"/>
           </a:p>
@@ -853,7 +854,7 @@
             <a:pPr rtl="0"/>
             <a:fld id="{A5A5ADE8-1FB8-43FD-A675-2B613EE00B6F}" type="datetime1">
               <a:rPr lang="de-DE" smtClean="0"/>
-              <a:t>04.01.2025</a:t>
+              <a:t>05.01.2025</a:t>
             </a:fld>
             <a:endParaRPr lang="en-US"/>
           </a:p>
@@ -877,7 +878,7 @@
             <a:pPr rtl="0"/>
             <a:fld id="{01B41D33-19C8-4450-B3C5-BE83E9C8F0BC}" type="slidenum">
               <a:rPr lang="en-US" smtClean="0"/>
-              <a:t>9</a:t>
+              <a:t>10</a:t>
             </a:fld>
             <a:endParaRPr lang="en-US"/>
           </a:p>
@@ -1137,7 +1138,7 @@
             <a:pPr rtl="0"/>
             <a:fld id="{81E9C95E-BEF0-4D2E-9127-B9099B238D2A}" type="datetime1">
               <a:rPr lang="de-DE" smtClean="0"/>
-              <a:t>04.01.2025</a:t>
+              <a:t>05.01.2025</a:t>
             </a:fld>
             <a:endParaRPr lang="en-US" dirty="0"/>
           </a:p>
@@ -1344,7 +1345,7 @@
             <a:pPr rtl="0"/>
             <a:fld id="{FE771757-BB18-44C5-813E-435E78C98126}" type="datetime1">
               <a:rPr lang="de-DE" smtClean="0"/>
-              <a:t>04.01.2025</a:t>
+              <a:t>05.01.2025</a:t>
             </a:fld>
             <a:endParaRPr lang="en-US" dirty="0"/>
           </a:p>
@@ -1710,7 +1711,7 @@
             <a:pPr rtl="0"/>
             <a:fld id="{B83FACD6-565C-4118-ACD0-32ACCA9AF940}" type="datetime1">
               <a:rPr lang="de-DE" smtClean="0"/>
-              <a:t>04.01.2025</a:t>
+              <a:t>05.01.2025</a:t>
             </a:fld>
             <a:endParaRPr lang="en-US" dirty="0"/>
           </a:p>
@@ -1912,7 +1913,7 @@
             <a:pPr rtl="0"/>
             <a:fld id="{83627DD0-092D-4AD9-AAE0-0513E170352E}" type="datetime1">
               <a:rPr lang="de-DE" smtClean="0"/>
-              <a:t>04.01.2025</a:t>
+              <a:t>05.01.2025</a:t>
             </a:fld>
             <a:endParaRPr lang="en-US" dirty="0"/>
           </a:p>
@@ -2228,7 +2229,7 @@
             <a:pPr rtl="0"/>
             <a:fld id="{F36CBEDB-B1DE-4F8C-AD4A-10AD3F77E1A9}" type="datetime1">
               <a:rPr lang="de-DE" smtClean="0"/>
-              <a:t>04.01.2025</a:t>
+              <a:t>05.01.2025</a:t>
             </a:fld>
             <a:endParaRPr lang="en-US" dirty="0"/>
           </a:p>
@@ -2485,7 +2486,7 @@
             <a:pPr rtl="0"/>
             <a:fld id="{F95AE019-BB99-4C3A-AA2C-A36C39CE4DCB}" type="datetime1">
               <a:rPr lang="de-DE" smtClean="0"/>
-              <a:t>04.01.2025</a:t>
+              <a:t>05.01.2025</a:t>
             </a:fld>
             <a:endParaRPr lang="en-US" dirty="0"/>
           </a:p>
@@ -2911,7 +2912,7 @@
             <a:pPr rtl="0"/>
             <a:fld id="{117FAFC6-AD0C-4B5B-B8B0-E729C6D4C810}" type="datetime1">
               <a:rPr lang="de-DE" smtClean="0"/>
-              <a:t>04.01.2025</a:t>
+              <a:t>05.01.2025</a:t>
             </a:fld>
             <a:endParaRPr lang="en-US" dirty="0"/>
           </a:p>
@@ -3038,7 +3039,7 @@
             <a:pPr rtl="0"/>
             <a:fld id="{607DEF3C-A2B0-4F78-836D-1A1B1DEE5467}" type="datetime1">
               <a:rPr lang="de-DE" smtClean="0"/>
-              <a:t>04.01.2025</a:t>
+              <a:t>05.01.2025</a:t>
             </a:fld>
             <a:endParaRPr lang="en-US" dirty="0"/>
           </a:p>
@@ -3136,7 +3137,7 @@
             <a:pPr rtl="0"/>
             <a:fld id="{D971D44B-9C44-467E-B481-41466CDBD2A7}" type="datetime1">
               <a:rPr lang="de-DE" smtClean="0"/>
-              <a:t>04.01.2025</a:t>
+              <a:t>05.01.2025</a:t>
             </a:fld>
             <a:endParaRPr lang="en-US" dirty="0"/>
           </a:p>
@@ -3517,7 +3518,7 @@
             <a:pPr rtl="0"/>
             <a:fld id="{0354EEBD-0E7F-42E6-BE86-4864547D749E}" type="datetime1">
               <a:rPr lang="de-DE" smtClean="0"/>
-              <a:t>04.01.2025</a:t>
+              <a:t>05.01.2025</a:t>
             </a:fld>
             <a:endParaRPr lang="en-US" dirty="0"/>
           </a:p>
@@ -3815,7 +3816,7 @@
             <a:pPr rtl="0"/>
             <a:fld id="{8C7274EF-79A2-4EAD-98EF-7E5BB5EA068D}" type="datetime1">
               <a:rPr lang="de-DE" smtClean="0"/>
-              <a:t>04.01.2025</a:t>
+              <a:t>05.01.2025</a:t>
             </a:fld>
             <a:endParaRPr lang="en-US" dirty="0"/>
           </a:p>
@@ -4033,7 +4034,7 @@
             <a:pPr rtl="0"/>
             <a:fld id="{EDD379EC-906B-4CE5-98C2-3A156331FD9E}" type="datetime1">
               <a:rPr lang="de-DE" smtClean="0"/>
-              <a:t>04.01.2025</a:t>
+              <a:t>05.01.2025</a:t>
             </a:fld>
             <a:endParaRPr lang="en-US" dirty="0"/>
           </a:p>
@@ -4813,7 +4814,7 @@
                   <a:spcPts val="600"/>
                 </a:spcAft>
               </a:pPr>
-              <a:t>04.01.2025</a:t>
+              <a:t>05.01.2025</a:t>
             </a:fld>
             <a:endParaRPr lang="en-US"/>
           </a:p>
@@ -4837,6 +4838,212 @@
   <p:cSld>
     <p:spTree>
       <p:nvGrpSpPr>
+        <p:cNvPr id="1" name="">
+          <a:extLst>
+            <a:ext uri="{FF2B5EF4-FFF2-40B4-BE49-F238E27FC236}">
+              <a16:creationId xmlns:a16="http://schemas.microsoft.com/office/drawing/2014/main" id="{4F5ADAE6-92F5-A3DF-51CC-4D84D8E490C3}"/>
+            </a:ext>
+          </a:extLst>
+        </p:cNvPr>
+        <p:cNvGrpSpPr/>
+        <p:nvPr/>
+      </p:nvGrpSpPr>
+      <p:grpSpPr>
+        <a:xfrm>
+          <a:off x="0" y="0"/>
+          <a:ext cx="0" cy="0"/>
+          <a:chOff x="0" y="0"/>
+          <a:chExt cx="0" cy="0"/>
+        </a:xfrm>
+      </p:grpSpPr>
+      <p:sp>
+        <p:nvSpPr>
+          <p:cNvPr id="2" name="Titel 1">
+            <a:extLst>
+              <a:ext uri="{FF2B5EF4-FFF2-40B4-BE49-F238E27FC236}">
+                <a16:creationId xmlns:a16="http://schemas.microsoft.com/office/drawing/2014/main" id="{A3819F07-9853-D6FF-F9B3-3CC2471081DE}"/>
+              </a:ext>
+            </a:extLst>
+          </p:cNvPr>
+          <p:cNvSpPr>
+            <a:spLocks noGrp="1"/>
+          </p:cNvSpPr>
+          <p:nvPr>
+            <p:ph type="title"/>
+          </p:nvPr>
+        </p:nvSpPr>
+        <p:spPr/>
+        <p:txBody>
+          <a:bodyPr/>
+          <a:lstStyle/>
+          <a:p>
+            <a:r>
+              <a:rPr lang="de-CH" dirty="0" err="1"/>
+              <a:t>CoDe</a:t>
+            </a:r>
+            <a:r>
+              <a:rPr lang="de-CH" dirty="0"/>
+              <a:t>-Ausschnitte: </a:t>
+            </a:r>
+            <a:r>
+              <a:rPr lang="de-CH" cap="none" dirty="0"/>
+              <a:t>whoosh_searcher.py</a:t>
+            </a:r>
+            <a:endParaRPr lang="de-CH" dirty="0"/>
+          </a:p>
+        </p:txBody>
+      </p:sp>
+      <p:sp>
+        <p:nvSpPr>
+          <p:cNvPr id="4" name="Datumsplatzhalter 3">
+            <a:extLst>
+              <a:ext uri="{FF2B5EF4-FFF2-40B4-BE49-F238E27FC236}">
+                <a16:creationId xmlns:a16="http://schemas.microsoft.com/office/drawing/2014/main" id="{E5D7520E-D5D3-97E5-B7C8-B08A2F45903C}"/>
+              </a:ext>
+            </a:extLst>
+          </p:cNvPr>
+          <p:cNvSpPr>
+            <a:spLocks noGrp="1"/>
+          </p:cNvSpPr>
+          <p:nvPr>
+            <p:ph type="dt" sz="half" idx="10"/>
+          </p:nvPr>
+        </p:nvSpPr>
+        <p:spPr/>
+        <p:txBody>
+          <a:bodyPr/>
+          <a:lstStyle/>
+          <a:p>
+            <a:pPr rtl="0"/>
+            <a:fld id="{83627DD0-092D-4AD9-AAE0-0513E170352E}" type="datetime1">
+              <a:rPr lang="de-DE" smtClean="0"/>
+              <a:t>05.01.2025</a:t>
+            </a:fld>
+            <a:endParaRPr lang="en-US" dirty="0"/>
+          </a:p>
+        </p:txBody>
+      </p:sp>
+      <p:sp>
+        <p:nvSpPr>
+          <p:cNvPr id="9" name="Inhaltsplatzhalter 8">
+            <a:extLst>
+              <a:ext uri="{FF2B5EF4-FFF2-40B4-BE49-F238E27FC236}">
+                <a16:creationId xmlns:a16="http://schemas.microsoft.com/office/drawing/2014/main" id="{E4BA6D64-83C0-112C-A568-8ACB45EAF0EB}"/>
+              </a:ext>
+            </a:extLst>
+          </p:cNvPr>
+          <p:cNvSpPr>
+            <a:spLocks noGrp="1"/>
+          </p:cNvSpPr>
+          <p:nvPr>
+            <p:ph idx="1"/>
+          </p:nvPr>
+        </p:nvSpPr>
+        <p:spPr>
+          <a:xfrm>
+            <a:off x="5607312" y="2340864"/>
+            <a:ext cx="6003495" cy="3634486"/>
+          </a:xfrm>
+        </p:spPr>
+        <p:txBody>
+          <a:bodyPr/>
+          <a:lstStyle/>
+          <a:p>
+            <a:r>
+              <a:rPr lang="de-CH" dirty="0"/>
+              <a:t>parametrisierbare Scoring Funktion berücksichtigt:</a:t>
+            </a:r>
+          </a:p>
+          <a:p>
+            <a:pPr lvl="1"/>
+            <a:r>
+              <a:rPr lang="de-CH" dirty="0"/>
+              <a:t>Position von Suchwörtern im Text</a:t>
+            </a:r>
+          </a:p>
+          <a:p>
+            <a:pPr lvl="1"/>
+            <a:r>
+              <a:rPr lang="de-CH" dirty="0"/>
+              <a:t>Abstand zwischen Suchwörtern</a:t>
+            </a:r>
+          </a:p>
+          <a:p>
+            <a:pPr lvl="1"/>
+            <a:r>
+              <a:rPr lang="de-CH" dirty="0"/>
+              <a:t>IDF (Inverse </a:t>
+            </a:r>
+            <a:r>
+              <a:rPr lang="de-CH" dirty="0" err="1"/>
+              <a:t>Document</a:t>
+            </a:r>
+            <a:r>
+              <a:rPr lang="de-CH" dirty="0"/>
+              <a:t> </a:t>
+            </a:r>
+            <a:r>
+              <a:rPr lang="de-CH" dirty="0" err="1"/>
+              <a:t>Frequency</a:t>
+            </a:r>
+            <a:r>
+              <a:rPr lang="de-CH" dirty="0"/>
+              <a:t>)</a:t>
+            </a:r>
+          </a:p>
+        </p:txBody>
+      </p:sp>
+      <p:pic>
+        <p:nvPicPr>
+          <p:cNvPr id="5" name="Grafik 4">
+            <a:extLst>
+              <a:ext uri="{FF2B5EF4-FFF2-40B4-BE49-F238E27FC236}">
+                <a16:creationId xmlns:a16="http://schemas.microsoft.com/office/drawing/2014/main" id="{B979AEAB-7F3F-A5FE-1E95-A12BDAFFEB4A}"/>
+              </a:ext>
+            </a:extLst>
+          </p:cNvPr>
+          <p:cNvPicPr>
+            <a:picLocks noChangeAspect="1"/>
+          </p:cNvPicPr>
+          <p:nvPr/>
+        </p:nvPicPr>
+        <p:blipFill>
+          <a:blip r:embed="rId3"/>
+          <a:stretch>
+            <a:fillRect/>
+          </a:stretch>
+        </p:blipFill>
+        <p:spPr>
+          <a:xfrm>
+            <a:off x="733030" y="2011978"/>
+            <a:ext cx="4409783" cy="4143866"/>
+          </a:xfrm>
+          <a:prstGeom prst="rect">
+            <a:avLst/>
+          </a:prstGeom>
+          <a:effectLst>
+            <a:softEdge rad="0"/>
+          </a:effectLst>
+        </p:spPr>
+      </p:pic>
+    </p:spTree>
+    <p:extLst>
+      <p:ext uri="{BB962C8B-B14F-4D97-AF65-F5344CB8AC3E}">
+        <p14:creationId xmlns:p14="http://schemas.microsoft.com/office/powerpoint/2010/main" val="858196720"/>
+      </p:ext>
+    </p:extLst>
+  </p:cSld>
+  <p:clrMapOvr>
+    <a:masterClrMapping/>
+  </p:clrMapOvr>
+</p:sld>
+</file>
+
+<file path=ppt/slides/slide11.xml><?xml version="1.0" encoding="utf-8"?>
+<p:sld xmlns:a="http://schemas.openxmlformats.org/drawingml/2006/main" xmlns:r="http://schemas.openxmlformats.org/officeDocument/2006/relationships" xmlns:p="http://schemas.openxmlformats.org/presentationml/2006/main">
+  <p:cSld>
+    <p:spTree>
+      <p:nvGrpSpPr>
         <p:cNvPr id="1" name=""/>
         <p:cNvGrpSpPr/>
         <p:nvPr/>
@@ -4901,7 +5108,7 @@
             <a:pPr rtl="0"/>
             <a:fld id="{83627DD0-092D-4AD9-AAE0-0513E170352E}" type="datetime1">
               <a:rPr lang="de-DE" smtClean="0"/>
-              <a:t>04.01.2025</a:t>
+              <a:t>05.01.2025</a:t>
             </a:fld>
             <a:endParaRPr lang="en-US" dirty="0"/>
           </a:p>
@@ -5079,7 +5286,7 @@
                   <a:spcPts val="600"/>
                 </a:spcAft>
               </a:pPr>
-              <a:t>04.01.2025</a:t>
+              <a:t>05.01.2025</a:t>
             </a:fld>
             <a:endParaRPr lang="en-US" dirty="0"/>
           </a:p>
@@ -5215,7 +5422,7 @@
             <a:pPr rtl="0"/>
             <a:fld id="{83627DD0-092D-4AD9-AAE0-0513E170352E}" type="datetime1">
               <a:rPr lang="de-DE" smtClean="0"/>
-              <a:t>04.01.2025</a:t>
+              <a:t>05.01.2025</a:t>
             </a:fld>
             <a:endParaRPr lang="en-US" dirty="0"/>
           </a:p>
@@ -5468,7 +5675,7 @@
             <a:pPr rtl="0"/>
             <a:fld id="{83627DD0-092D-4AD9-AAE0-0513E170352E}" type="datetime1">
               <a:rPr lang="de-DE" smtClean="0"/>
-              <a:t>04.01.2025</a:t>
+              <a:t>05.01.2025</a:t>
             </a:fld>
             <a:endParaRPr lang="en-US" dirty="0"/>
           </a:p>
@@ -5565,7 +5772,7 @@
             <a:pPr rtl="0"/>
             <a:fld id="{83627DD0-092D-4AD9-AAE0-0513E170352E}" type="datetime1">
               <a:rPr lang="de-DE" smtClean="0"/>
-              <a:t>04.01.2025</a:t>
+              <a:t>05.01.2025</a:t>
             </a:fld>
             <a:endParaRPr lang="en-US" dirty="0"/>
           </a:p>
@@ -5728,7 +5935,7 @@
           <a:p>
             <a:r>
               <a:rPr lang="de-CH" dirty="0"/>
-              <a:t>Flexibles Schema für Index:</a:t>
+              <a:t>Flexibles Schema für Index Generierung:</a:t>
             </a:r>
           </a:p>
         </p:txBody>
@@ -5757,7 +5964,7 @@
             <a:pPr rtl="0"/>
             <a:fld id="{83627DD0-092D-4AD9-AAE0-0513E170352E}" type="datetime1">
               <a:rPr lang="de-DE" smtClean="0"/>
-              <a:t>04.01.2025</a:t>
+              <a:t>05.01.2025</a:t>
             </a:fld>
             <a:endParaRPr lang="en-US" dirty="0"/>
           </a:p>
@@ -5765,10 +5972,10 @@
       </p:sp>
       <p:pic>
         <p:nvPicPr>
-          <p:cNvPr id="9" name="Grafik 8">
+          <p:cNvPr id="6" name="Grafik 5">
             <a:extLst>
               <a:ext uri="{FF2B5EF4-FFF2-40B4-BE49-F238E27FC236}">
-                <a16:creationId xmlns:a16="http://schemas.microsoft.com/office/drawing/2014/main" id="{387C9D1A-4BD5-813E-8EE3-7D53B803B689}"/>
+                <a16:creationId xmlns:a16="http://schemas.microsoft.com/office/drawing/2014/main" id="{5AD26F19-04D2-41B4-5A3D-D76E8659A77F}"/>
               </a:ext>
             </a:extLst>
           </p:cNvPr>
@@ -5785,8 +5992,8 @@
         </p:blipFill>
         <p:spPr>
           <a:xfrm>
-            <a:off x="994826" y="2343911"/>
-            <a:ext cx="8473024" cy="3590799"/>
+            <a:off x="613596" y="2303240"/>
+            <a:ext cx="10964805" cy="2038635"/>
           </a:xfrm>
           <a:prstGeom prst="rect">
             <a:avLst/>
@@ -5930,7 +6137,7 @@
             <a:pPr rtl="0"/>
             <a:fld id="{83627DD0-092D-4AD9-AAE0-0513E170352E}" type="datetime1">
               <a:rPr lang="de-DE" smtClean="0"/>
-              <a:t>04.01.2025</a:t>
+              <a:t>05.01.2025</a:t>
             </a:fld>
             <a:endParaRPr lang="en-US" dirty="0"/>
           </a:p>
@@ -6136,7 +6343,7 @@
             <a:pPr rtl="0"/>
             <a:fld id="{83627DD0-092D-4AD9-AAE0-0513E170352E}" type="datetime1">
               <a:rPr lang="de-DE" smtClean="0"/>
-              <a:t>04.01.2025</a:t>
+              <a:t>05.01.2025</a:t>
             </a:fld>
             <a:endParaRPr lang="en-US" dirty="0"/>
           </a:p>
@@ -6190,13 +6397,7 @@
   <p:cSld>
     <p:spTree>
       <p:nvGrpSpPr>
-        <p:cNvPr id="1" name="">
-          <a:extLst>
-            <a:ext uri="{FF2B5EF4-FFF2-40B4-BE49-F238E27FC236}">
-              <a16:creationId xmlns:a16="http://schemas.microsoft.com/office/drawing/2014/main" id="{4F5ADAE6-92F5-A3DF-51CC-4D84D8E490C3}"/>
-            </a:ext>
-          </a:extLst>
-        </p:cNvPr>
+        <p:cNvPr id="1" name=""/>
         <p:cNvGrpSpPr/>
         <p:nvPr/>
       </p:nvGrpSpPr>
@@ -6213,7 +6414,7 @@
           <p:cNvPr id="2" name="Titel 1">
             <a:extLst>
               <a:ext uri="{FF2B5EF4-FFF2-40B4-BE49-F238E27FC236}">
-                <a16:creationId xmlns:a16="http://schemas.microsoft.com/office/drawing/2014/main" id="{A3819F07-9853-D6FF-F9B3-3CC2471081DE}"/>
+                <a16:creationId xmlns:a16="http://schemas.microsoft.com/office/drawing/2014/main" id="{D4C793FA-74BB-78AB-4815-313A5750AFCA}"/>
               </a:ext>
             </a:extLst>
           </p:cNvPr>
@@ -6231,16 +6432,191 @@
           <a:p>
             <a:r>
               <a:rPr lang="de-CH" dirty="0" err="1"/>
-              <a:t>CoDe</a:t>
+              <a:t>CoDe-AuFbau</a:t>
             </a:r>
             <a:r>
               <a:rPr lang="de-CH" dirty="0"/>
-              <a:t>-Aufbau: </a:t>
+              <a:t>: </a:t>
             </a:r>
             <a:r>
               <a:rPr lang="de-CH" cap="none" dirty="0"/>
               <a:t>whoosh_searcher.py</a:t>
             </a:r>
+            <a:endParaRPr lang="de-CH" dirty="0"/>
+          </a:p>
+        </p:txBody>
+      </p:sp>
+      <p:sp>
+        <p:nvSpPr>
+          <p:cNvPr id="3" name="Inhaltsplatzhalter 2">
+            <a:extLst>
+              <a:ext uri="{FF2B5EF4-FFF2-40B4-BE49-F238E27FC236}">
+                <a16:creationId xmlns:a16="http://schemas.microsoft.com/office/drawing/2014/main" id="{85F5DCA9-4731-B178-1315-2C733DD9D637}"/>
+              </a:ext>
+            </a:extLst>
+          </p:cNvPr>
+          <p:cNvSpPr>
+            <a:spLocks noGrp="1"/>
+          </p:cNvSpPr>
+          <p:nvPr>
+            <p:ph idx="1"/>
+          </p:nvPr>
+        </p:nvSpPr>
+        <p:spPr/>
+        <p:txBody>
+          <a:bodyPr/>
+          <a:lstStyle/>
+          <a:p>
+            <a:r>
+              <a:rPr lang="de-CH" b="0" dirty="0" err="1">
+                <a:solidFill>
+                  <a:srgbClr val="569CD6"/>
+                </a:solidFill>
+                <a:effectLst/>
+                <a:latin typeface="Consolas" panose="020B0609020204030204" pitchFamily="49" charset="0"/>
+              </a:rPr>
+              <a:t>class</a:t>
+            </a:r>
+            <a:r>
+              <a:rPr lang="de-CH" b="0" dirty="0">
+                <a:solidFill>
+                  <a:srgbClr val="CCCCCC"/>
+                </a:solidFill>
+                <a:effectLst/>
+                <a:latin typeface="Consolas" panose="020B0609020204030204" pitchFamily="49" charset="0"/>
+              </a:rPr>
+              <a:t> </a:t>
+            </a:r>
+            <a:r>
+              <a:rPr lang="de-CH" b="0" dirty="0" err="1">
+                <a:solidFill>
+                  <a:srgbClr val="4EC9B0"/>
+                </a:solidFill>
+                <a:effectLst/>
+                <a:latin typeface="Consolas" panose="020B0609020204030204" pitchFamily="49" charset="0"/>
+              </a:rPr>
+              <a:t>CustomScoring</a:t>
+            </a:r>
+            <a:r>
+              <a:rPr lang="de-CH" b="0" dirty="0">
+                <a:solidFill>
+                  <a:srgbClr val="CCCCCC"/>
+                </a:solidFill>
+                <a:effectLst/>
+                <a:latin typeface="Consolas" panose="020B0609020204030204" pitchFamily="49" charset="0"/>
+              </a:rPr>
+              <a:t>(</a:t>
+            </a:r>
+            <a:r>
+              <a:rPr lang="de-CH" b="0" dirty="0" err="1">
+                <a:solidFill>
+                  <a:srgbClr val="4EC9B0"/>
+                </a:solidFill>
+                <a:effectLst/>
+                <a:latin typeface="Consolas" panose="020B0609020204030204" pitchFamily="49" charset="0"/>
+              </a:rPr>
+              <a:t>FunctionWeighting</a:t>
+            </a:r>
+            <a:r>
+              <a:rPr lang="de-CH" b="0" dirty="0">
+                <a:solidFill>
+                  <a:srgbClr val="CCCCCC"/>
+                </a:solidFill>
+                <a:effectLst/>
+                <a:latin typeface="Consolas" panose="020B0609020204030204" pitchFamily="49" charset="0"/>
+              </a:rPr>
+              <a:t>): </a:t>
+            </a:r>
+            <a:r>
+              <a:rPr lang="de-CH" dirty="0"/>
+              <a:t>Berechnungsfunktion für Scoring</a:t>
+            </a:r>
+          </a:p>
+          <a:p>
+            <a:r>
+              <a:rPr lang="de-CH" b="0" dirty="0" err="1">
+                <a:solidFill>
+                  <a:srgbClr val="569CD6"/>
+                </a:solidFill>
+                <a:effectLst/>
+                <a:latin typeface="Consolas" panose="020B0609020204030204" pitchFamily="49" charset="0"/>
+              </a:rPr>
+              <a:t>class</a:t>
+            </a:r>
+            <a:r>
+              <a:rPr lang="de-CH" b="0" dirty="0">
+                <a:solidFill>
+                  <a:srgbClr val="CCCCCC"/>
+                </a:solidFill>
+                <a:effectLst/>
+                <a:latin typeface="Consolas" panose="020B0609020204030204" pitchFamily="49" charset="0"/>
+              </a:rPr>
+              <a:t> </a:t>
+            </a:r>
+            <a:r>
+              <a:rPr lang="de-CH" b="0" dirty="0" err="1">
+                <a:solidFill>
+                  <a:srgbClr val="4EC9B0"/>
+                </a:solidFill>
+                <a:effectLst/>
+                <a:latin typeface="Consolas" panose="020B0609020204030204" pitchFamily="49" charset="0"/>
+              </a:rPr>
+              <a:t>WhooshSearchEngine</a:t>
+            </a:r>
+            <a:r>
+              <a:rPr lang="de-CH" b="0" dirty="0">
+                <a:solidFill>
+                  <a:srgbClr val="CCCCCC"/>
+                </a:solidFill>
+                <a:effectLst/>
+                <a:latin typeface="Consolas" panose="020B0609020204030204" pitchFamily="49" charset="0"/>
+              </a:rPr>
+              <a:t>:</a:t>
+            </a:r>
+          </a:p>
+          <a:p>
+            <a:pPr lvl="1"/>
+            <a:r>
+              <a:rPr lang="de-CH" dirty="0"/>
+              <a:t>Laden des Index</a:t>
+            </a:r>
+          </a:p>
+          <a:p>
+            <a:pPr lvl="1"/>
+            <a:r>
+              <a:rPr lang="de-CH" dirty="0"/>
+              <a:t>Durchsuchen und Bewertung der Suchergebnisse</a:t>
+            </a:r>
+          </a:p>
+          <a:p>
+            <a:pPr lvl="1"/>
+            <a:r>
+              <a:rPr lang="de-CH" dirty="0"/>
+              <a:t>Aufbereitung der Suchresultate</a:t>
+            </a:r>
+          </a:p>
+          <a:p>
+            <a:r>
+              <a:rPr lang="de-CH" dirty="0"/>
+              <a:t>Initialisierung der Web App (</a:t>
+            </a:r>
+            <a:r>
+              <a:rPr lang="de-CH" dirty="0" err="1"/>
+              <a:t>Flask</a:t>
+            </a:r>
+            <a:r>
+              <a:rPr lang="de-CH" dirty="0"/>
+              <a:t> Library </a:t>
+            </a:r>
+            <a:r>
+              <a:rPr lang="de-CH" dirty="0">
+                <a:sym typeface="Wingdings" panose="05000000000000000000" pitchFamily="2" charset="2"/>
+              </a:rPr>
+              <a:t> Individuelles HTML-Template für Suchmaske / Resultate)</a:t>
+            </a:r>
+            <a:endParaRPr lang="de-CH" dirty="0"/>
+          </a:p>
+          <a:p>
             <a:endParaRPr lang="de-CH" dirty="0"/>
           </a:p>
         </p:txBody>
@@ -6250,7 +6626,7 @@
           <p:cNvPr id="4" name="Datumsplatzhalter 3">
             <a:extLst>
               <a:ext uri="{FF2B5EF4-FFF2-40B4-BE49-F238E27FC236}">
-                <a16:creationId xmlns:a16="http://schemas.microsoft.com/office/drawing/2014/main" id="{E5D7520E-D5D3-97E5-B7C8-B08A2F45903C}"/>
+                <a16:creationId xmlns:a16="http://schemas.microsoft.com/office/drawing/2014/main" id="{61BEA81D-5276-71B8-A984-DD996D141566}"/>
               </a:ext>
             </a:extLst>
           </p:cNvPr>
@@ -6269,53 +6645,16 @@
             <a:pPr rtl="0"/>
             <a:fld id="{83627DD0-092D-4AD9-AAE0-0513E170352E}" type="datetime1">
               <a:rPr lang="de-DE" smtClean="0"/>
-              <a:t>04.01.2025</a:t>
+              <a:t>05.01.2025</a:t>
             </a:fld>
             <a:endParaRPr lang="en-US" dirty="0"/>
-          </a:p>
-        </p:txBody>
-      </p:sp>
-      <p:sp>
-        <p:nvSpPr>
-          <p:cNvPr id="9" name="Inhaltsplatzhalter 8">
-            <a:extLst>
-              <a:ext uri="{FF2B5EF4-FFF2-40B4-BE49-F238E27FC236}">
-                <a16:creationId xmlns:a16="http://schemas.microsoft.com/office/drawing/2014/main" id="{E4BA6D64-83C0-112C-A568-8ACB45EAF0EB}"/>
-              </a:ext>
-            </a:extLst>
-          </p:cNvPr>
-          <p:cNvSpPr>
-            <a:spLocks noGrp="1"/>
-          </p:cNvSpPr>
-          <p:nvPr>
-            <p:ph idx="1"/>
-          </p:nvPr>
-        </p:nvSpPr>
-        <p:spPr/>
-        <p:txBody>
-          <a:bodyPr/>
-          <a:lstStyle/>
-          <a:p>
-            <a:r>
-              <a:rPr lang="de-CH" dirty="0" err="1">
-                <a:highlight>
-                  <a:srgbClr val="FFFF00"/>
-                </a:highlight>
-              </a:rPr>
-              <a:t>tbd</a:t>
-            </a:r>
-            <a:endParaRPr lang="de-CH" dirty="0">
-              <a:highlight>
-                <a:srgbClr val="FFFF00"/>
-              </a:highlight>
-            </a:endParaRPr>
           </a:p>
         </p:txBody>
       </p:sp>
     </p:spTree>
     <p:extLst>
       <p:ext uri="{BB962C8B-B14F-4D97-AF65-F5344CB8AC3E}">
-        <p14:creationId xmlns:p14="http://schemas.microsoft.com/office/powerpoint/2010/main" val="858196720"/>
+        <p14:creationId xmlns:p14="http://schemas.microsoft.com/office/powerpoint/2010/main" val="467968019"/>
       </p:ext>
     </p:extLst>
   </p:cSld>

</xml_diff>